<commit_message>
Fehlendes "self" bei __init__ ergänzt
</commit_message>
<xml_diff>
--- a/Anleitungen/Python Erweitert.pptx
+++ b/Anleitungen/Python Erweitert.pptx
@@ -323,7 +323,7 @@
           <a:p>
             <a:fld id="{FC467CC9-39D6-4C14-8FF0-DC490C2A5864}" type="datetimeFigureOut">
               <a:rPr lang="de-DE" smtClean="0"/>
-              <a:t>08.03.2017</a:t>
+              <a:t>09.03.2017</a:t>
             </a:fld>
             <a:endParaRPr lang="de-DE" dirty="0"/>
           </a:p>
@@ -5569,8 +5569,28 @@
               <a:t>__(</a:t>
             </a:r>
             <a:r>
+              <a:rPr lang="de-DE" i="1" dirty="0" err="1" smtClean="0">
+                <a:solidFill>
+                  <a:srgbClr val="F37637"/>
+                </a:solidFill>
+              </a:rPr>
+              <a:t>self</a:t>
+            </a:r>
+            <a:r>
+              <a:rPr lang="de-DE" i="1" smtClean="0">
+                <a:solidFill>
+                  <a:srgbClr val="F37637"/>
+                </a:solidFill>
+              </a:rPr>
+              <a:t>, </a:t>
+            </a:r>
+            <a:r>
+              <a:rPr lang="de-DE" i="1" smtClean="0"/>
+              <a:t>argument1</a:t>
+            </a:r>
+            <a:r>
               <a:rPr lang="de-DE" i="1" dirty="0" smtClean="0"/>
-              <a:t>argument1, …</a:t>
+              <a:t>, …</a:t>
             </a:r>
             <a:r>
               <a:rPr lang="de-DE" i="1" dirty="0" smtClean="0">

</xml_diff>